<commit_message>
new image and problem statement
</commit_message>
<xml_diff>
--- a/images/images-work.pptx
+++ b/images/images-work.pptx
@@ -10,6 +10,8 @@
     <p:sldId id="258" r:id="rId4"/>
     <p:sldId id="259" r:id="rId5"/>
     <p:sldId id="260" r:id="rId6"/>
+    <p:sldId id="261" r:id="rId7"/>
+    <p:sldId id="262" r:id="rId8"/>
   </p:sldIdLst>
   <p:sldSz cx="12192000" cy="6858000"/>
   <p:notesSz cx="6858000" cy="9144000"/>
@@ -3902,42 +3904,858 @@
       </p:grpSpPr>
       <p:sp>
         <p:nvSpPr>
-          <p:cNvPr id="2" name="Titre 1"/>
-          <p:cNvSpPr>
-            <a:spLocks noGrp="1"/>
-          </p:cNvSpPr>
-          <p:nvPr>
-            <p:ph type="title"/>
-          </p:nvPr>
-        </p:nvSpPr>
-        <p:spPr/>
-        <p:txBody>
-          <a:bodyPr/>
-          <a:lstStyle/>
-          <a:p>
-            <a:endParaRPr lang="fr-FR"/>
-          </a:p>
-        </p:txBody>
-      </p:sp>
-      <p:sp>
-        <p:nvSpPr>
-          <p:cNvPr id="3" name="Espace réservé du contenu 2"/>
-          <p:cNvSpPr>
-            <a:spLocks noGrp="1"/>
-          </p:cNvSpPr>
-          <p:nvPr>
-            <p:ph idx="1"/>
-          </p:nvPr>
-        </p:nvSpPr>
-        <p:spPr/>
-        <p:txBody>
-          <a:bodyPr/>
-          <a:lstStyle/>
-          <a:p>
-            <a:endParaRPr lang="fr-FR"/>
-          </a:p>
-        </p:txBody>
-      </p:sp>
+          <p:cNvPr id="11" name="Rectangle 10"/>
+          <p:cNvSpPr/>
+          <p:nvPr/>
+        </p:nvSpPr>
+        <p:spPr>
+          <a:xfrm>
+            <a:off x="4101973" y="1657595"/>
+            <a:ext cx="1774278" cy="519086"/>
+          </a:xfrm>
+          <a:prstGeom prst="rect">
+            <a:avLst/>
+          </a:prstGeom>
+          <a:solidFill>
+            <a:schemeClr val="accent1">
+              <a:lumMod val="20000"/>
+              <a:lumOff val="80000"/>
+            </a:schemeClr>
+          </a:solidFill>
+        </p:spPr>
+        <p:style>
+          <a:lnRef idx="2">
+            <a:schemeClr val="accent1">
+              <a:shade val="50000"/>
+            </a:schemeClr>
+          </a:lnRef>
+          <a:fillRef idx="1">
+            <a:schemeClr val="accent1"/>
+          </a:fillRef>
+          <a:effectRef idx="0">
+            <a:schemeClr val="accent1"/>
+          </a:effectRef>
+          <a:fontRef idx="minor">
+            <a:schemeClr val="lt1"/>
+          </a:fontRef>
+        </p:style>
+        <p:txBody>
+          <a:bodyPr rtlCol="0" anchor="ctr"/>
+          <a:lstStyle/>
+          <a:p>
+            <a:pPr algn="ctr"/>
+            <a:r>
+              <a:rPr lang="fr-FR" dirty="0" smtClean="0">
+                <a:solidFill>
+                  <a:schemeClr val="tx1"/>
+                </a:solidFill>
+              </a:rPr>
+              <a:t>Link </a:t>
+            </a:r>
+            <a:r>
+              <a:rPr lang="fr-FR" dirty="0" err="1" smtClean="0">
+                <a:solidFill>
+                  <a:schemeClr val="tx1"/>
+                </a:solidFill>
+              </a:rPr>
+              <a:t>generated</a:t>
+            </a:r>
+            <a:r>
+              <a:rPr lang="fr-FR" dirty="0" smtClean="0">
+                <a:solidFill>
+                  <a:schemeClr val="tx1"/>
+                </a:solidFill>
+              </a:rPr>
+              <a:t> at compilation</a:t>
+            </a:r>
+            <a:endParaRPr lang="fr-FR" dirty="0">
+              <a:solidFill>
+                <a:schemeClr val="tx1"/>
+              </a:solidFill>
+            </a:endParaRPr>
+          </a:p>
+        </p:txBody>
+      </p:sp>
+      <p:sp>
+        <p:nvSpPr>
+          <p:cNvPr id="4" name="Parchemin vertical 3"/>
+          <p:cNvSpPr/>
+          <p:nvPr/>
+        </p:nvSpPr>
+        <p:spPr>
+          <a:xfrm>
+            <a:off x="1387022" y="979753"/>
+            <a:ext cx="1811865" cy="1355684"/>
+          </a:xfrm>
+          <a:prstGeom prst="verticalScroll">
+            <a:avLst/>
+          </a:prstGeom>
+        </p:spPr>
+        <p:style>
+          <a:lnRef idx="2">
+            <a:schemeClr val="accent1">
+              <a:shade val="50000"/>
+            </a:schemeClr>
+          </a:lnRef>
+          <a:fillRef idx="1">
+            <a:schemeClr val="accent1"/>
+          </a:fillRef>
+          <a:effectRef idx="0">
+            <a:schemeClr val="accent1"/>
+          </a:effectRef>
+          <a:fontRef idx="minor">
+            <a:schemeClr val="lt1"/>
+          </a:fontRef>
+        </p:style>
+        <p:txBody>
+          <a:bodyPr rtlCol="0" anchor="ctr"/>
+          <a:lstStyle/>
+          <a:p>
+            <a:pPr algn="ctr"/>
+            <a:r>
+              <a:rPr lang="fr-FR" sz="2400" dirty="0" smtClean="0">
+                <a:solidFill>
+                  <a:schemeClr val="tx1"/>
+                </a:solidFill>
+              </a:rPr>
+              <a:t>…</a:t>
+            </a:r>
+          </a:p>
+          <a:p>
+            <a:pPr algn="ctr"/>
+            <a:r>
+              <a:rPr lang="fr-FR" sz="2400" dirty="0" err="1" smtClean="0">
+                <a:solidFill>
+                  <a:schemeClr val="tx1"/>
+                </a:solidFill>
+              </a:rPr>
+              <a:t>foo</a:t>
+            </a:r>
+            <a:r>
+              <a:rPr lang="fr-FR" sz="2400" dirty="0" smtClean="0">
+                <a:solidFill>
+                  <a:schemeClr val="tx1"/>
+                </a:solidFill>
+              </a:rPr>
+              <a:t>()</a:t>
+            </a:r>
+          </a:p>
+          <a:p>
+            <a:pPr algn="ctr"/>
+            <a:r>
+              <a:rPr lang="fr-FR" sz="2400" dirty="0" smtClean="0">
+                <a:solidFill>
+                  <a:schemeClr val="tx1"/>
+                </a:solidFill>
+              </a:rPr>
+              <a:t>…</a:t>
+            </a:r>
+            <a:endParaRPr lang="fr-FR" sz="2400" dirty="0">
+              <a:solidFill>
+                <a:schemeClr val="tx1"/>
+              </a:solidFill>
+            </a:endParaRPr>
+          </a:p>
+        </p:txBody>
+      </p:sp>
+      <p:sp>
+        <p:nvSpPr>
+          <p:cNvPr id="5" name="ZoneTexte 4"/>
+          <p:cNvSpPr txBox="1"/>
+          <p:nvPr/>
+        </p:nvSpPr>
+        <p:spPr>
+          <a:xfrm>
+            <a:off x="1802531" y="610421"/>
+            <a:ext cx="980846" cy="369332"/>
+          </a:xfrm>
+          <a:prstGeom prst="rect">
+            <a:avLst/>
+          </a:prstGeom>
+          <a:solidFill>
+            <a:schemeClr val="bg1"/>
+          </a:solidFill>
+        </p:spPr>
+        <p:style>
+          <a:lnRef idx="2">
+            <a:schemeClr val="accent1">
+              <a:shade val="50000"/>
+            </a:schemeClr>
+          </a:lnRef>
+          <a:fillRef idx="1">
+            <a:schemeClr val="accent1"/>
+          </a:fillRef>
+          <a:effectRef idx="0">
+            <a:schemeClr val="accent1"/>
+          </a:effectRef>
+          <a:fontRef idx="minor">
+            <a:schemeClr val="lt1"/>
+          </a:fontRef>
+        </p:style>
+        <p:txBody>
+          <a:bodyPr wrap="none" rtlCol="0">
+            <a:spAutoFit/>
+          </a:bodyPr>
+          <a:lstStyle/>
+          <a:p>
+            <a:r>
+              <a:rPr lang="fr-FR" dirty="0" err="1" smtClean="0">
+                <a:solidFill>
+                  <a:schemeClr val="tx1"/>
+                </a:solidFill>
+              </a:rPr>
+              <a:t>Runtime</a:t>
+            </a:r>
+            <a:endParaRPr lang="fr-FR" dirty="0">
+              <a:solidFill>
+                <a:schemeClr val="tx1"/>
+              </a:solidFill>
+            </a:endParaRPr>
+          </a:p>
+        </p:txBody>
+      </p:sp>
+      <p:sp>
+        <p:nvSpPr>
+          <p:cNvPr id="6" name="Rectangle à coins arrondis 5"/>
+          <p:cNvSpPr/>
+          <p:nvPr/>
+        </p:nvSpPr>
+        <p:spPr>
+          <a:xfrm>
+            <a:off x="7023813" y="1354157"/>
+            <a:ext cx="2443742" cy="614925"/>
+          </a:xfrm>
+          <a:prstGeom prst="roundRect">
+            <a:avLst/>
+          </a:prstGeom>
+        </p:spPr>
+        <p:style>
+          <a:lnRef idx="2">
+            <a:schemeClr val="accent1">
+              <a:shade val="50000"/>
+            </a:schemeClr>
+          </a:lnRef>
+          <a:fillRef idx="1">
+            <a:schemeClr val="accent1"/>
+          </a:fillRef>
+          <a:effectRef idx="0">
+            <a:schemeClr val="accent1"/>
+          </a:effectRef>
+          <a:fontRef idx="minor">
+            <a:schemeClr val="lt1"/>
+          </a:fontRef>
+        </p:style>
+        <p:txBody>
+          <a:bodyPr rtlCol="0" anchor="ctr"/>
+          <a:lstStyle/>
+          <a:p>
+            <a:pPr algn="ctr"/>
+            <a:r>
+              <a:rPr lang="fr-FR" dirty="0" err="1" smtClean="0">
+                <a:solidFill>
+                  <a:schemeClr val="tx1"/>
+                </a:solidFill>
+              </a:rPr>
+              <a:t>ContextProxy.invoke</a:t>
+            </a:r>
+            <a:r>
+              <a:rPr lang="fr-FR" dirty="0" smtClean="0">
+                <a:solidFill>
+                  <a:schemeClr val="tx1"/>
+                </a:solidFill>
+              </a:rPr>
+              <a:t>(…)</a:t>
+            </a:r>
+            <a:endParaRPr lang="fr-FR" dirty="0">
+              <a:solidFill>
+                <a:schemeClr val="tx1"/>
+              </a:solidFill>
+            </a:endParaRPr>
+          </a:p>
+        </p:txBody>
+      </p:sp>
+      <p:cxnSp>
+        <p:nvCxnSpPr>
+          <p:cNvPr id="8" name="Connecteur droit avec flèche 7"/>
+          <p:cNvCxnSpPr>
+            <a:stCxn id="4" idx="3"/>
+            <a:endCxn id="6" idx="1"/>
+          </p:cNvCxnSpPr>
+          <p:nvPr/>
+        </p:nvCxnSpPr>
+        <p:spPr>
+          <a:xfrm>
+            <a:off x="3029427" y="1657595"/>
+            <a:ext cx="3994386" cy="4025"/>
+          </a:xfrm>
+          <a:prstGeom prst="straightConnector1">
+            <a:avLst/>
+          </a:prstGeom>
+          <a:ln>
+            <a:tailEnd type="triangle"/>
+          </a:ln>
+        </p:spPr>
+        <p:style>
+          <a:lnRef idx="1">
+            <a:schemeClr val="accent1"/>
+          </a:lnRef>
+          <a:fillRef idx="0">
+            <a:schemeClr val="accent1"/>
+          </a:fillRef>
+          <a:effectRef idx="0">
+            <a:schemeClr val="accent1"/>
+          </a:effectRef>
+          <a:fontRef idx="minor">
+            <a:schemeClr val="tx1"/>
+          </a:fontRef>
+        </p:style>
+      </p:cxnSp>
+      <p:sp>
+        <p:nvSpPr>
+          <p:cNvPr id="13" name="Vague 12"/>
+          <p:cNvSpPr/>
+          <p:nvPr/>
+        </p:nvSpPr>
+        <p:spPr>
+          <a:xfrm>
+            <a:off x="6996592" y="2851112"/>
+            <a:ext cx="2498183" cy="678725"/>
+          </a:xfrm>
+          <a:prstGeom prst="wave">
+            <a:avLst/>
+          </a:prstGeom>
+          <a:solidFill>
+            <a:schemeClr val="accent1">
+              <a:lumMod val="60000"/>
+              <a:lumOff val="40000"/>
+            </a:schemeClr>
+          </a:solidFill>
+        </p:spPr>
+        <p:style>
+          <a:lnRef idx="2">
+            <a:schemeClr val="accent1">
+              <a:shade val="50000"/>
+            </a:schemeClr>
+          </a:lnRef>
+          <a:fillRef idx="1">
+            <a:schemeClr val="accent1"/>
+          </a:fillRef>
+          <a:effectRef idx="0">
+            <a:schemeClr val="accent1"/>
+          </a:effectRef>
+          <a:fontRef idx="minor">
+            <a:schemeClr val="lt1"/>
+          </a:fontRef>
+        </p:style>
+        <p:txBody>
+          <a:bodyPr rtlCol="0" anchor="ctr"/>
+          <a:lstStyle/>
+          <a:p>
+            <a:pPr algn="ctr"/>
+            <a:r>
+              <a:rPr lang="fr-FR" dirty="0" err="1" smtClean="0">
+                <a:solidFill>
+                  <a:schemeClr val="tx1"/>
+                </a:solidFill>
+              </a:rPr>
+              <a:t>FunctionInvocationEvent</a:t>
+            </a:r>
+            <a:endParaRPr lang="fr-FR" dirty="0">
+              <a:solidFill>
+                <a:schemeClr val="tx1"/>
+              </a:solidFill>
+            </a:endParaRPr>
+          </a:p>
+        </p:txBody>
+      </p:sp>
+      <p:cxnSp>
+        <p:nvCxnSpPr>
+          <p:cNvPr id="15" name="Connecteur droit avec flèche 14"/>
+          <p:cNvCxnSpPr>
+            <a:stCxn id="6" idx="2"/>
+            <a:endCxn id="13" idx="0"/>
+          </p:cNvCxnSpPr>
+          <p:nvPr/>
+        </p:nvCxnSpPr>
+        <p:spPr>
+          <a:xfrm>
+            <a:off x="8245684" y="1969082"/>
+            <a:ext cx="0" cy="966871"/>
+          </a:xfrm>
+          <a:prstGeom prst="straightConnector1">
+            <a:avLst/>
+          </a:prstGeom>
+          <a:ln>
+            <a:tailEnd type="triangle"/>
+          </a:ln>
+        </p:spPr>
+        <p:style>
+          <a:lnRef idx="1">
+            <a:schemeClr val="accent1"/>
+          </a:lnRef>
+          <a:fillRef idx="0">
+            <a:schemeClr val="accent1"/>
+          </a:fillRef>
+          <a:effectRef idx="0">
+            <a:schemeClr val="accent1"/>
+          </a:effectRef>
+          <a:fontRef idx="minor">
+            <a:schemeClr val="tx1"/>
+          </a:fontRef>
+        </p:style>
+      </p:cxnSp>
+      <p:cxnSp>
+        <p:nvCxnSpPr>
+          <p:cNvPr id="21" name="Connecteur droit avec flèche 20"/>
+          <p:cNvCxnSpPr>
+            <a:stCxn id="13" idx="1"/>
+            <a:endCxn id="24" idx="5"/>
+          </p:cNvCxnSpPr>
+          <p:nvPr/>
+        </p:nvCxnSpPr>
+        <p:spPr>
+          <a:xfrm flipH="1">
+            <a:off x="5969784" y="3190475"/>
+            <a:ext cx="1026808" cy="11017"/>
+          </a:xfrm>
+          <a:prstGeom prst="straightConnector1">
+            <a:avLst/>
+          </a:prstGeom>
+          <a:ln>
+            <a:tailEnd type="triangle"/>
+          </a:ln>
+        </p:spPr>
+        <p:style>
+          <a:lnRef idx="1">
+            <a:schemeClr val="accent1"/>
+          </a:lnRef>
+          <a:fillRef idx="0">
+            <a:schemeClr val="accent1"/>
+          </a:fillRef>
+          <a:effectRef idx="0">
+            <a:schemeClr val="accent1"/>
+          </a:effectRef>
+          <a:fontRef idx="minor">
+            <a:schemeClr val="tx1"/>
+          </a:fontRef>
+        </p:style>
+      </p:cxnSp>
+      <p:sp>
+        <p:nvSpPr>
+          <p:cNvPr id="24" name="Cube 23"/>
+          <p:cNvSpPr/>
+          <p:nvPr/>
+        </p:nvSpPr>
+        <p:spPr>
+          <a:xfrm>
+            <a:off x="4051623" y="2639632"/>
+            <a:ext cx="1918161" cy="1498293"/>
+          </a:xfrm>
+          <a:prstGeom prst="cube">
+            <a:avLst/>
+          </a:prstGeom>
+        </p:spPr>
+        <p:style>
+          <a:lnRef idx="2">
+            <a:schemeClr val="accent1">
+              <a:shade val="50000"/>
+            </a:schemeClr>
+          </a:lnRef>
+          <a:fillRef idx="1">
+            <a:schemeClr val="accent1"/>
+          </a:fillRef>
+          <a:effectRef idx="0">
+            <a:schemeClr val="accent1"/>
+          </a:effectRef>
+          <a:fontRef idx="minor">
+            <a:schemeClr val="lt1"/>
+          </a:fontRef>
+        </p:style>
+        <p:txBody>
+          <a:bodyPr rtlCol="0" anchor="ctr"/>
+          <a:lstStyle/>
+          <a:p>
+            <a:pPr algn="ctr"/>
+            <a:r>
+              <a:rPr lang="fr-FR" dirty="0" err="1" smtClean="0">
+                <a:solidFill>
+                  <a:schemeClr val="tx1"/>
+                </a:solidFill>
+              </a:rPr>
+              <a:t>Decision</a:t>
+            </a:r>
+            <a:r>
+              <a:rPr lang="fr-FR" dirty="0" smtClean="0">
+                <a:solidFill>
+                  <a:schemeClr val="tx1"/>
+                </a:solidFill>
+              </a:rPr>
+              <a:t> Maker</a:t>
+            </a:r>
+            <a:endParaRPr lang="fr-FR" dirty="0">
+              <a:solidFill>
+                <a:schemeClr val="tx1"/>
+              </a:solidFill>
+            </a:endParaRPr>
+          </a:p>
+        </p:txBody>
+      </p:sp>
+      <p:sp>
+        <p:nvSpPr>
+          <p:cNvPr id="32" name="Rectangle 31"/>
+          <p:cNvSpPr/>
+          <p:nvPr/>
+        </p:nvSpPr>
+        <p:spPr>
+          <a:xfrm>
+            <a:off x="1296845" y="2732781"/>
+            <a:ext cx="1960098" cy="291356"/>
+          </a:xfrm>
+          <a:prstGeom prst="rect">
+            <a:avLst/>
+          </a:prstGeom>
+        </p:spPr>
+        <p:style>
+          <a:lnRef idx="2">
+            <a:schemeClr val="accent1">
+              <a:shade val="50000"/>
+            </a:schemeClr>
+          </a:lnRef>
+          <a:fillRef idx="1">
+            <a:schemeClr val="accent1"/>
+          </a:fillRef>
+          <a:effectRef idx="0">
+            <a:schemeClr val="accent1"/>
+          </a:effectRef>
+          <a:fontRef idx="minor">
+            <a:schemeClr val="lt1"/>
+          </a:fontRef>
+        </p:style>
+        <p:txBody>
+          <a:bodyPr rtlCol="0" anchor="ctr"/>
+          <a:lstStyle/>
+          <a:p>
+            <a:pPr algn="ctr"/>
+            <a:r>
+              <a:rPr lang="fr-FR" dirty="0" err="1" smtClean="0"/>
+              <a:t>foo</a:t>
+            </a:r>
+            <a:r>
+              <a:rPr lang="fr-FR" dirty="0" smtClean="0"/>
+              <a:t>||@(context1)</a:t>
+            </a:r>
+            <a:endParaRPr lang="fr-FR" dirty="0"/>
+          </a:p>
+        </p:txBody>
+      </p:sp>
+      <p:sp>
+        <p:nvSpPr>
+          <p:cNvPr id="33" name="Rectangle 32"/>
+          <p:cNvSpPr/>
+          <p:nvPr/>
+        </p:nvSpPr>
+        <p:spPr>
+          <a:xfrm>
+            <a:off x="1296845" y="3279750"/>
+            <a:ext cx="1960098" cy="291356"/>
+          </a:xfrm>
+          <a:prstGeom prst="rect">
+            <a:avLst/>
+          </a:prstGeom>
+        </p:spPr>
+        <p:style>
+          <a:lnRef idx="2">
+            <a:schemeClr val="accent1">
+              <a:shade val="50000"/>
+            </a:schemeClr>
+          </a:lnRef>
+          <a:fillRef idx="1">
+            <a:schemeClr val="accent1"/>
+          </a:fillRef>
+          <a:effectRef idx="0">
+            <a:schemeClr val="accent1"/>
+          </a:effectRef>
+          <a:fontRef idx="minor">
+            <a:schemeClr val="lt1"/>
+          </a:fontRef>
+        </p:style>
+        <p:txBody>
+          <a:bodyPr rtlCol="0" anchor="ctr"/>
+          <a:lstStyle/>
+          <a:p>
+            <a:pPr algn="ctr"/>
+            <a:r>
+              <a:rPr lang="fr-FR" dirty="0" err="1" smtClean="0"/>
+              <a:t>foo</a:t>
+            </a:r>
+            <a:r>
+              <a:rPr lang="fr-FR" dirty="0" smtClean="0"/>
+              <a:t>||@(context2)</a:t>
+            </a:r>
+            <a:endParaRPr lang="fr-FR" dirty="0"/>
+          </a:p>
+        </p:txBody>
+      </p:sp>
+      <p:sp>
+        <p:nvSpPr>
+          <p:cNvPr id="34" name="Rectangle 33"/>
+          <p:cNvSpPr/>
+          <p:nvPr/>
+        </p:nvSpPr>
+        <p:spPr>
+          <a:xfrm>
+            <a:off x="1296845" y="3826720"/>
+            <a:ext cx="1960098" cy="291356"/>
+          </a:xfrm>
+          <a:prstGeom prst="rect">
+            <a:avLst/>
+          </a:prstGeom>
+        </p:spPr>
+        <p:style>
+          <a:lnRef idx="2">
+            <a:schemeClr val="accent1">
+              <a:shade val="50000"/>
+            </a:schemeClr>
+          </a:lnRef>
+          <a:fillRef idx="1">
+            <a:schemeClr val="accent1"/>
+          </a:fillRef>
+          <a:effectRef idx="0">
+            <a:schemeClr val="accent1"/>
+          </a:effectRef>
+          <a:fontRef idx="minor">
+            <a:schemeClr val="lt1"/>
+          </a:fontRef>
+        </p:style>
+        <p:txBody>
+          <a:bodyPr rtlCol="0" anchor="ctr"/>
+          <a:lstStyle/>
+          <a:p>
+            <a:pPr algn="ctr"/>
+            <a:r>
+              <a:rPr lang="fr-FR" dirty="0" err="1" smtClean="0"/>
+              <a:t>foo</a:t>
+            </a:r>
+            <a:r>
+              <a:rPr lang="fr-FR" dirty="0" smtClean="0"/>
+              <a:t>||@(context3)</a:t>
+            </a:r>
+            <a:endParaRPr lang="fr-FR" dirty="0"/>
+          </a:p>
+        </p:txBody>
+      </p:sp>
+      <p:cxnSp>
+        <p:nvCxnSpPr>
+          <p:cNvPr id="37" name="Connecteur droit avec flèche 36"/>
+          <p:cNvCxnSpPr>
+            <a:stCxn id="24" idx="2"/>
+            <a:endCxn id="33" idx="3"/>
+          </p:cNvCxnSpPr>
+          <p:nvPr/>
+        </p:nvCxnSpPr>
+        <p:spPr>
+          <a:xfrm flipH="1" flipV="1">
+            <a:off x="3256943" y="3425428"/>
+            <a:ext cx="794680" cy="150637"/>
+          </a:xfrm>
+          <a:prstGeom prst="straightConnector1">
+            <a:avLst/>
+          </a:prstGeom>
+          <a:ln>
+            <a:tailEnd type="triangle"/>
+          </a:ln>
+        </p:spPr>
+        <p:style>
+          <a:lnRef idx="1">
+            <a:schemeClr val="accent1"/>
+          </a:lnRef>
+          <a:fillRef idx="0">
+            <a:schemeClr val="accent1"/>
+          </a:fillRef>
+          <a:effectRef idx="0">
+            <a:schemeClr val="accent1"/>
+          </a:effectRef>
+          <a:fontRef idx="minor">
+            <a:schemeClr val="tx1"/>
+          </a:fontRef>
+        </p:style>
+      </p:cxnSp>
+      <p:sp>
+        <p:nvSpPr>
+          <p:cNvPr id="38" name="Rectangle 37"/>
+          <p:cNvSpPr/>
+          <p:nvPr/>
+        </p:nvSpPr>
+        <p:spPr>
+          <a:xfrm>
+            <a:off x="8245683" y="2232770"/>
+            <a:ext cx="684061" cy="322311"/>
+          </a:xfrm>
+          <a:prstGeom prst="rect">
+            <a:avLst/>
+          </a:prstGeom>
+          <a:solidFill>
+            <a:schemeClr val="accent1">
+              <a:lumMod val="20000"/>
+              <a:lumOff val="80000"/>
+            </a:schemeClr>
+          </a:solidFill>
+        </p:spPr>
+        <p:style>
+          <a:lnRef idx="2">
+            <a:schemeClr val="accent1">
+              <a:shade val="50000"/>
+            </a:schemeClr>
+          </a:lnRef>
+          <a:fillRef idx="1">
+            <a:schemeClr val="accent1"/>
+          </a:fillRef>
+          <a:effectRef idx="0">
+            <a:schemeClr val="accent1"/>
+          </a:effectRef>
+          <a:fontRef idx="minor">
+            <a:schemeClr val="lt1"/>
+          </a:fontRef>
+        </p:style>
+        <p:txBody>
+          <a:bodyPr rtlCol="0" anchor="ctr"/>
+          <a:lstStyle/>
+          <a:p>
+            <a:pPr algn="ctr"/>
+            <a:r>
+              <a:rPr lang="fr-FR" dirty="0" err="1" smtClean="0">
+                <a:solidFill>
+                  <a:schemeClr val="tx1"/>
+                </a:solidFill>
+              </a:rPr>
+              <a:t>Send</a:t>
+            </a:r>
+            <a:endParaRPr lang="fr-FR" dirty="0">
+              <a:solidFill>
+                <a:schemeClr val="tx1"/>
+              </a:solidFill>
+            </a:endParaRPr>
+          </a:p>
+        </p:txBody>
+      </p:sp>
+      <p:sp>
+        <p:nvSpPr>
+          <p:cNvPr id="40" name="Organigramme : Disque magnétique 39"/>
+          <p:cNvSpPr/>
+          <p:nvPr/>
+        </p:nvSpPr>
+        <p:spPr>
+          <a:xfrm>
+            <a:off x="4226286" y="5006588"/>
+            <a:ext cx="1525651" cy="959623"/>
+          </a:xfrm>
+          <a:prstGeom prst="flowChartMagneticDisk">
+            <a:avLst/>
+          </a:prstGeom>
+        </p:spPr>
+        <p:style>
+          <a:lnRef idx="2">
+            <a:schemeClr val="accent1">
+              <a:shade val="50000"/>
+            </a:schemeClr>
+          </a:lnRef>
+          <a:fillRef idx="1">
+            <a:schemeClr val="accent1"/>
+          </a:fillRef>
+          <a:effectRef idx="0">
+            <a:schemeClr val="accent1"/>
+          </a:effectRef>
+          <a:fontRef idx="minor">
+            <a:schemeClr val="lt1"/>
+          </a:fontRef>
+        </p:style>
+        <p:txBody>
+          <a:bodyPr rtlCol="0" anchor="ctr"/>
+          <a:lstStyle/>
+          <a:p>
+            <a:pPr algn="ctr"/>
+            <a:r>
+              <a:rPr lang="fr-FR" dirty="0" err="1" smtClean="0">
+                <a:solidFill>
+                  <a:schemeClr val="tx1"/>
+                </a:solidFill>
+              </a:rPr>
+              <a:t>Context</a:t>
+            </a:r>
+            <a:endParaRPr lang="fr-FR" dirty="0">
+              <a:solidFill>
+                <a:schemeClr val="tx1"/>
+              </a:solidFill>
+            </a:endParaRPr>
+          </a:p>
+        </p:txBody>
+      </p:sp>
+      <p:cxnSp>
+        <p:nvCxnSpPr>
+          <p:cNvPr id="42" name="Connecteur droit avec flèche 41"/>
+          <p:cNvCxnSpPr/>
+          <p:nvPr/>
+        </p:nvCxnSpPr>
+        <p:spPr>
+          <a:xfrm flipH="1">
+            <a:off x="5268686" y="4118076"/>
+            <a:ext cx="0" cy="888512"/>
+          </a:xfrm>
+          <a:prstGeom prst="straightConnector1">
+            <a:avLst/>
+          </a:prstGeom>
+          <a:ln>
+            <a:tailEnd type="triangle"/>
+          </a:ln>
+        </p:spPr>
+        <p:style>
+          <a:lnRef idx="1">
+            <a:schemeClr val="accent1"/>
+          </a:lnRef>
+          <a:fillRef idx="0">
+            <a:schemeClr val="accent1"/>
+          </a:fillRef>
+          <a:effectRef idx="0">
+            <a:schemeClr val="accent1"/>
+          </a:effectRef>
+          <a:fontRef idx="minor">
+            <a:schemeClr val="tx1"/>
+          </a:fontRef>
+        </p:style>
+      </p:cxnSp>
+      <p:cxnSp>
+        <p:nvCxnSpPr>
+          <p:cNvPr id="43" name="Connecteur droit avec flèche 42"/>
+          <p:cNvCxnSpPr/>
+          <p:nvPr/>
+        </p:nvCxnSpPr>
+        <p:spPr>
+          <a:xfrm flipH="1" flipV="1">
+            <a:off x="4558063" y="4137925"/>
+            <a:ext cx="0" cy="888512"/>
+          </a:xfrm>
+          <a:prstGeom prst="straightConnector1">
+            <a:avLst/>
+          </a:prstGeom>
+          <a:ln>
+            <a:tailEnd type="triangle"/>
+          </a:ln>
+        </p:spPr>
+        <p:style>
+          <a:lnRef idx="1">
+            <a:schemeClr val="accent1"/>
+          </a:lnRef>
+          <a:fillRef idx="0">
+            <a:schemeClr val="accent1"/>
+          </a:fillRef>
+          <a:effectRef idx="0">
+            <a:schemeClr val="accent1"/>
+          </a:effectRef>
+          <a:fontRef idx="minor">
+            <a:schemeClr val="tx1"/>
+          </a:fontRef>
+        </p:style>
+      </p:cxnSp>
     </p:spTree>
     <p:extLst>
       <p:ext uri="{BB962C8B-B14F-4D97-AF65-F5344CB8AC3E}">
@@ -3968,48 +4786,208 @@
           <a:chExt cx="0" cy="0"/>
         </a:xfrm>
       </p:grpSpPr>
-      <p:sp>
-        <p:nvSpPr>
-          <p:cNvPr id="2" name="Titre 1"/>
-          <p:cNvSpPr>
-            <a:spLocks noGrp="1"/>
-          </p:cNvSpPr>
-          <p:nvPr>
-            <p:ph type="title"/>
-          </p:nvPr>
-        </p:nvSpPr>
-        <p:spPr/>
-        <p:txBody>
-          <a:bodyPr/>
-          <a:lstStyle/>
-          <a:p>
-            <a:endParaRPr lang="fr-FR"/>
-          </a:p>
-        </p:txBody>
-      </p:sp>
-      <p:sp>
-        <p:nvSpPr>
-          <p:cNvPr id="3" name="Espace réservé du contenu 2"/>
-          <p:cNvSpPr>
-            <a:spLocks noGrp="1"/>
-          </p:cNvSpPr>
-          <p:nvPr>
-            <p:ph idx="1"/>
-          </p:nvPr>
-        </p:nvSpPr>
-        <p:spPr/>
-        <p:txBody>
-          <a:bodyPr/>
-          <a:lstStyle/>
-          <a:p>
-            <a:endParaRPr lang="fr-FR"/>
-          </a:p>
-        </p:txBody>
-      </p:sp>
+      <p:pic>
+        <p:nvPicPr>
+          <p:cNvPr id="21" name="Image 20"/>
+          <p:cNvPicPr>
+            <a:picLocks noChangeAspect="1"/>
+          </p:cNvPicPr>
+          <p:nvPr/>
+        </p:nvPicPr>
+        <p:blipFill>
+          <a:blip r:embed="rId2"/>
+          <a:stretch>
+            <a:fillRect/>
+          </a:stretch>
+        </p:blipFill>
+        <p:spPr>
+          <a:xfrm>
+            <a:off x="1965602" y="731286"/>
+            <a:ext cx="8260796" cy="5395428"/>
+          </a:xfrm>
+          <a:prstGeom prst="rect">
+            <a:avLst/>
+          </a:prstGeom>
+        </p:spPr>
+      </p:pic>
     </p:spTree>
     <p:extLst>
       <p:ext uri="{BB962C8B-B14F-4D97-AF65-F5344CB8AC3E}">
         <p14:creationId xmlns:p14="http://schemas.microsoft.com/office/powerpoint/2010/main" val="695686333"/>
+      </p:ext>
+    </p:extLst>
+  </p:cSld>
+  <p:clrMapOvr>
+    <a:masterClrMapping/>
+  </p:clrMapOvr>
+</p:sld>
+</file>
+
+<file path=ppt/slides/slide6.xml><?xml version="1.0" encoding="utf-8"?>
+<p:sld xmlns:a="http://schemas.openxmlformats.org/drawingml/2006/main" xmlns:r="http://schemas.openxmlformats.org/officeDocument/2006/relationships" xmlns:p="http://schemas.openxmlformats.org/presentationml/2006/main">
+  <p:cSld>
+    <p:spTree>
+      <p:nvGrpSpPr>
+        <p:cNvPr id="1" name=""/>
+        <p:cNvGrpSpPr/>
+        <p:nvPr/>
+      </p:nvGrpSpPr>
+      <p:grpSpPr>
+        <a:xfrm>
+          <a:off x="0" y="0"/>
+          <a:ext cx="0" cy="0"/>
+          <a:chOff x="0" y="0"/>
+          <a:chExt cx="0" cy="0"/>
+        </a:xfrm>
+      </p:grpSpPr>
+      <p:pic>
+        <p:nvPicPr>
+          <p:cNvPr id="4" name="Image 3"/>
+          <p:cNvPicPr>
+            <a:picLocks noChangeAspect="1"/>
+          </p:cNvPicPr>
+          <p:nvPr/>
+        </p:nvPicPr>
+        <p:blipFill>
+          <a:blip r:embed="rId2" cstate="print">
+            <a:extLst>
+              <a:ext uri="{28A0092B-C50C-407E-A947-70E740481C1C}">
+                <a14:useLocalDpi xmlns:a14="http://schemas.microsoft.com/office/drawing/2010/main" val="0"/>
+              </a:ext>
+            </a:extLst>
+          </a:blip>
+          <a:stretch>
+            <a:fillRect/>
+          </a:stretch>
+        </p:blipFill>
+        <p:spPr>
+          <a:xfrm>
+            <a:off x="1179067" y="1498600"/>
+            <a:ext cx="1761187" cy="1252220"/>
+          </a:xfrm>
+          <a:prstGeom prst="rect">
+            <a:avLst/>
+          </a:prstGeom>
+        </p:spPr>
+      </p:pic>
+      <p:pic>
+        <p:nvPicPr>
+          <p:cNvPr id="5" name="Image 4"/>
+          <p:cNvPicPr>
+            <a:picLocks noChangeAspect="1"/>
+          </p:cNvPicPr>
+          <p:nvPr/>
+        </p:nvPicPr>
+        <p:blipFill>
+          <a:blip r:embed="rId2" cstate="print">
+            <a:extLst>
+              <a:ext uri="{28A0092B-C50C-407E-A947-70E740481C1C}">
+                <a14:useLocalDpi xmlns:a14="http://schemas.microsoft.com/office/drawing/2010/main" val="0"/>
+              </a:ext>
+            </a:extLst>
+          </a:blip>
+          <a:stretch>
+            <a:fillRect/>
+          </a:stretch>
+        </p:blipFill>
+        <p:spPr>
+          <a:xfrm>
+            <a:off x="1179067" y="2844800"/>
+            <a:ext cx="1761187" cy="1252220"/>
+          </a:xfrm>
+          <a:prstGeom prst="rect">
+            <a:avLst/>
+          </a:prstGeom>
+        </p:spPr>
+      </p:pic>
+      <p:pic>
+        <p:nvPicPr>
+          <p:cNvPr id="6" name="Image 5"/>
+          <p:cNvPicPr>
+            <a:picLocks noChangeAspect="1"/>
+          </p:cNvPicPr>
+          <p:nvPr/>
+        </p:nvPicPr>
+        <p:blipFill>
+          <a:blip r:embed="rId2" cstate="print">
+            <a:extLst>
+              <a:ext uri="{28A0092B-C50C-407E-A947-70E740481C1C}">
+                <a14:useLocalDpi xmlns:a14="http://schemas.microsoft.com/office/drawing/2010/main" val="0"/>
+              </a:ext>
+            </a:extLst>
+          </a:blip>
+          <a:stretch>
+            <a:fillRect/>
+          </a:stretch>
+        </p:blipFill>
+        <p:spPr>
+          <a:xfrm>
+            <a:off x="1179067" y="4191000"/>
+            <a:ext cx="1761187" cy="1252220"/>
+          </a:xfrm>
+          <a:prstGeom prst="rect">
+            <a:avLst/>
+          </a:prstGeom>
+        </p:spPr>
+      </p:pic>
+      <p:pic>
+        <p:nvPicPr>
+          <p:cNvPr id="8" name="Image 7"/>
+          <p:cNvPicPr>
+            <a:picLocks noChangeAspect="1"/>
+          </p:cNvPicPr>
+          <p:nvPr/>
+        </p:nvPicPr>
+        <p:blipFill>
+          <a:blip r:embed="rId3"/>
+          <a:stretch>
+            <a:fillRect/>
+          </a:stretch>
+        </p:blipFill>
+        <p:spPr>
+          <a:xfrm>
+            <a:off x="5570907" y="1404582"/>
+            <a:ext cx="1050186" cy="4048837"/>
+          </a:xfrm>
+          <a:prstGeom prst="rect">
+            <a:avLst/>
+          </a:prstGeom>
+        </p:spPr>
+      </p:pic>
+    </p:spTree>
+    <p:extLst>
+      <p:ext uri="{BB962C8B-B14F-4D97-AF65-F5344CB8AC3E}">
+        <p14:creationId xmlns:p14="http://schemas.microsoft.com/office/powerpoint/2010/main" val="1611523889"/>
+      </p:ext>
+    </p:extLst>
+  </p:cSld>
+  <p:clrMapOvr>
+    <a:masterClrMapping/>
+  </p:clrMapOvr>
+</p:sld>
+</file>
+
+<file path=ppt/slides/slide7.xml><?xml version="1.0" encoding="utf-8"?>
+<p:sld xmlns:a="http://schemas.openxmlformats.org/drawingml/2006/main" xmlns:r="http://schemas.openxmlformats.org/officeDocument/2006/relationships" xmlns:p="http://schemas.openxmlformats.org/presentationml/2006/main">
+  <p:cSld>
+    <p:spTree>
+      <p:nvGrpSpPr>
+        <p:cNvPr id="1" name=""/>
+        <p:cNvGrpSpPr/>
+        <p:nvPr/>
+      </p:nvGrpSpPr>
+      <p:grpSpPr>
+        <a:xfrm>
+          <a:off x="0" y="0"/>
+          <a:ext cx="0" cy="0"/>
+          <a:chOff x="0" y="0"/>
+          <a:chExt cx="0" cy="0"/>
+        </a:xfrm>
+      </p:grpSpPr>
+    </p:spTree>
+    <p:extLst>
+      <p:ext uri="{BB962C8B-B14F-4D97-AF65-F5344CB8AC3E}">
+        <p14:creationId xmlns:p14="http://schemas.microsoft.com/office/powerpoint/2010/main" val="3055618847"/>
       </p:ext>
     </p:extLst>
   </p:cSld>

</xml_diff>